<commit_message>
chore(rapport) : update rapport and powerpoint
</commit_message>
<xml_diff>
--- a/doc/P_CLOUD_346.pptx
+++ b/doc/P_CLOUD_346.pptx
@@ -4888,36 +4888,35 @@
           </a:p>
         </p:txBody>
       </p:sp>
-      <p:sp>
-        <p:nvSpPr>
-          <p:cNvPr id="3" name="Espace réservé du contenu 2">
+      <p:pic>
+        <p:nvPicPr>
+          <p:cNvPr id="5" name="Espace réservé du contenu 4">
             <a:extLst>
               <a:ext uri="{FF2B5EF4-FFF2-40B4-BE49-F238E27FC236}">
-                <a16:creationId xmlns:a16="http://schemas.microsoft.com/office/drawing/2014/main" id="{1DECA62A-3261-D2FA-DD0A-C0DDD104529A}"/>
+                <a16:creationId xmlns:a16="http://schemas.microsoft.com/office/drawing/2014/main" id="{A9AA2C65-7733-755E-7482-230873D3DE96}"/>
               </a:ext>
             </a:extLst>
           </p:cNvPr>
-          <p:cNvSpPr>
-            <a:spLocks noGrp="1"/>
-          </p:cNvSpPr>
+          <p:cNvPicPr>
+            <a:picLocks noGrp="1" noChangeAspect="1"/>
+          </p:cNvPicPr>
           <p:nvPr>
             <p:ph idx="1"/>
           </p:nvPr>
-        </p:nvSpPr>
+        </p:nvPicPr>
+        <p:blipFill>
+          <a:blip r:embed="rId2"/>
+          <a:stretch>
+            <a:fillRect/>
+          </a:stretch>
+        </p:blipFill>
         <p:spPr>
           <a:xfrm>
-            <a:off x="838200" y="1825625"/>
-            <a:ext cx="10515600" cy="4351338"/>
+            <a:off x="2130876" y="1825625"/>
+            <a:ext cx="7930248" cy="4351338"/>
           </a:xfrm>
         </p:spPr>
-        <p:txBody>
-          <a:bodyPr/>
-          <a:lstStyle/>
-          <a:p>
-            <a:endParaRPr lang="fr-CH" dirty="0"/>
-          </a:p>
-        </p:txBody>
-      </p:sp>
+      </p:pic>
     </p:spTree>
     <p:extLst>
       <p:ext uri="{BB962C8B-B14F-4D97-AF65-F5344CB8AC3E}">

</xml_diff>